<commit_message>
add outline to icons
</commit_message>
<xml_diff>
--- a/app design.pptx
+++ b/app design.pptx
@@ -10287,7 +10287,7 @@
         <p:spPr>
           <a:xfrm>
             <a:off x="701389" y="2208774"/>
-            <a:ext cx="2191690" cy="2031325"/>
+            <a:ext cx="2219325" cy="2585323"/>
           </a:xfrm>
           <a:prstGeom prst="rect">
             <a:avLst/>
@@ -10364,6 +10364,34 @@
             <a:r>
               <a:rPr lang="en-US" dirty="0"/>
               <a:t>Lake or Pool pref.</a:t>
+            </a:r>
+          </a:p>
+          <a:p>
+            <a:pPr marL="285750" indent="-285750" algn="l" rtl="0">
+              <a:buFont typeface="Arial" panose="020B0604020202020204" pitchFamily="34" charset="0"/>
+              <a:buChar char="•"/>
+            </a:pPr>
+            <a:r>
+              <a:rPr lang="en-US" dirty="0"/>
+              <a:t>HOFF partner pref.</a:t>
+            </a:r>
+          </a:p>
+          <a:p>
+            <a:pPr marL="742950" lvl="1" indent="-285750" algn="l" rtl="0">
+              <a:buFont typeface="Arial" panose="020B0604020202020204" pitchFamily="34" charset="0"/>
+              <a:buChar char="•"/>
+            </a:pPr>
+            <a:r>
+              <a:rPr lang="en-US" dirty="0"/>
+              <a:t>Or </a:t>
+            </a:r>
+            <a:r>
+              <a:rPr lang="en-US" dirty="0" err="1"/>
+              <a:t>hoff</a:t>
+            </a:r>
+            <a:r>
+              <a:rPr lang="en-US" dirty="0"/>
+              <a:t> pref.</a:t>
             </a:r>
             <a:endParaRPr lang="he-IL" dirty="0"/>
           </a:p>
@@ -25153,7 +25181,7 @@
           <p:nvPr>
             <p:extLst>
               <p:ext uri="{D42A27DB-BD31-4B8C-83A1-F6EECF244321}">
-                <p14:modId xmlns:p14="http://schemas.microsoft.com/office/powerpoint/2010/main" val="791471650"/>
+                <p14:modId xmlns:p14="http://schemas.microsoft.com/office/powerpoint/2010/main" val="2661369365"/>
               </p:ext>
             </p:extLst>
           </p:nvPr>
@@ -27471,7 +27499,7 @@
                     <a:lstStyle/>
                     <a:p>
                       <a:pPr algn="ctr" rtl="1"/>
-                      <a:endParaRPr lang="he-IL" sz="1400"/>
+                      <a:endParaRPr lang="he-IL" sz="1400" dirty="0"/>
                     </a:p>
                   </a:txBody>
                   <a:tcPr anchor="ctr">
@@ -27782,7 +27810,7 @@
                     <a:lstStyle/>
                     <a:p>
                       <a:pPr algn="ctr" rtl="1"/>
-                      <a:endParaRPr lang="he-IL" sz="1400"/>
+                      <a:endParaRPr lang="he-IL" sz="1400" dirty="0"/>
                     </a:p>
                   </a:txBody>
                   <a:tcPr anchor="ctr">
@@ -28093,7 +28121,7 @@
                     <a:lstStyle/>
                     <a:p>
                       <a:pPr algn="ctr" rtl="1"/>
-                      <a:endParaRPr lang="he-IL" sz="1400"/>
+                      <a:endParaRPr lang="he-IL" sz="1400" dirty="0"/>
                     </a:p>
                   </a:txBody>
                   <a:tcPr anchor="ctr">

</xml_diff>